<commit_message>
Save ppt with 'Embed TrueType fonts' option
</commit_message>
<xml_diff>
--- a/ppt/파이썬 스터디 2주.pptx
+++ b/ppt/파이썬 스터디 2주.pptx
@@ -1,6 +1,6 @@
 
 <file path=ppt/presentation.xml><?xml version="1.0" encoding="utf-8"?>
-<p:presentation xmlns:a="http://schemas.openxmlformats.org/drawingml/2006/main" xmlns:r="http://schemas.openxmlformats.org/officeDocument/2006/relationships" xmlns:p="http://schemas.openxmlformats.org/presentationml/2006/main" saveSubsetFonts="1">
+<p:presentation xmlns:a="http://schemas.openxmlformats.org/drawingml/2006/main" xmlns:r="http://schemas.openxmlformats.org/officeDocument/2006/relationships" xmlns:p="http://schemas.openxmlformats.org/presentationml/2006/main" embedTrueTypeFonts="1" saveSubsetFonts="1">
   <p:sldMasterIdLst>
     <p:sldMasterId id="2147483648" r:id="rId1"/>
   </p:sldMasterIdLst>
@@ -19,6 +19,32 @@
   </p:sldIdLst>
   <p:sldSz cx="12192000" cy="6858000"/>
   <p:notesSz cx="6858000" cy="9144000"/>
+  <p:embeddedFontLst>
+    <p:embeddedFont>
+      <p:font typeface="HY견고딕" panose="02030600000101010101" pitchFamily="18" charset="-127"/>
+      <p:regular r:id="rId13"/>
+    </p:embeddedFont>
+    <p:embeddedFont>
+      <p:font typeface="Tmon몬소리 Black" panose="02000A03000000000000" pitchFamily="2" charset="-127"/>
+      <p:bold r:id="rId14"/>
+    </p:embeddedFont>
+    <p:embeddedFont>
+      <p:font typeface="맑은 고딕" panose="020B0503020000020004" pitchFamily="50" charset="-127"/>
+      <p:regular r:id="rId15"/>
+      <p:bold r:id="rId16"/>
+    </p:embeddedFont>
+    <p:embeddedFont>
+      <p:font typeface="Tium" panose="02000800000000000000" pitchFamily="2" charset="0"/>
+      <p:bold r:id="rId17"/>
+    </p:embeddedFont>
+    <p:embeddedFont>
+      <p:font typeface="Consolas" panose="020B0609020204030204" pitchFamily="49" charset="0"/>
+      <p:regular r:id="rId18"/>
+      <p:bold r:id="rId19"/>
+      <p:italic r:id="rId20"/>
+      <p:boldItalic r:id="rId21"/>
+    </p:embeddedFont>
+  </p:embeddedFontLst>
   <p:defaultTextStyle>
     <a:defPPr>
       <a:defRPr lang="ko-KR"/>
@@ -253,7 +279,7 @@
           <a:p>
             <a:fld id="{5357D70D-0FC2-4F0F-94F2-74B024D3FA26}" type="datetimeFigureOut">
               <a:rPr lang="ko-KR" altLang="en-US" smtClean="0"/>
-              <a:t>2016-09-19</a:t>
+              <a:t>2016-10-13</a:t>
             </a:fld>
             <a:endParaRPr lang="ko-KR" altLang="en-US"/>
           </a:p>
@@ -423,7 +449,7 @@
           <a:p>
             <a:fld id="{5357D70D-0FC2-4F0F-94F2-74B024D3FA26}" type="datetimeFigureOut">
               <a:rPr lang="ko-KR" altLang="en-US" smtClean="0"/>
-              <a:t>2016-09-19</a:t>
+              <a:t>2016-10-13</a:t>
             </a:fld>
             <a:endParaRPr lang="ko-KR" altLang="en-US"/>
           </a:p>
@@ -603,7 +629,7 @@
           <a:p>
             <a:fld id="{5357D70D-0FC2-4F0F-94F2-74B024D3FA26}" type="datetimeFigureOut">
               <a:rPr lang="ko-KR" altLang="en-US" smtClean="0"/>
-              <a:t>2016-09-19</a:t>
+              <a:t>2016-10-13</a:t>
             </a:fld>
             <a:endParaRPr lang="ko-KR" altLang="en-US"/>
           </a:p>
@@ -773,7 +799,7 @@
           <a:p>
             <a:fld id="{5357D70D-0FC2-4F0F-94F2-74B024D3FA26}" type="datetimeFigureOut">
               <a:rPr lang="ko-KR" altLang="en-US" smtClean="0"/>
-              <a:t>2016-09-19</a:t>
+              <a:t>2016-10-13</a:t>
             </a:fld>
             <a:endParaRPr lang="ko-KR" altLang="en-US"/>
           </a:p>
@@ -1019,7 +1045,7 @@
           <a:p>
             <a:fld id="{5357D70D-0FC2-4F0F-94F2-74B024D3FA26}" type="datetimeFigureOut">
               <a:rPr lang="ko-KR" altLang="en-US" smtClean="0"/>
-              <a:t>2016-09-19</a:t>
+              <a:t>2016-10-13</a:t>
             </a:fld>
             <a:endParaRPr lang="ko-KR" altLang="en-US"/>
           </a:p>
@@ -1251,7 +1277,7 @@
           <a:p>
             <a:fld id="{5357D70D-0FC2-4F0F-94F2-74B024D3FA26}" type="datetimeFigureOut">
               <a:rPr lang="ko-KR" altLang="en-US" smtClean="0"/>
-              <a:t>2016-09-19</a:t>
+              <a:t>2016-10-13</a:t>
             </a:fld>
             <a:endParaRPr lang="ko-KR" altLang="en-US"/>
           </a:p>
@@ -1618,7 +1644,7 @@
           <a:p>
             <a:fld id="{5357D70D-0FC2-4F0F-94F2-74B024D3FA26}" type="datetimeFigureOut">
               <a:rPr lang="ko-KR" altLang="en-US" smtClean="0"/>
-              <a:t>2016-09-19</a:t>
+              <a:t>2016-10-13</a:t>
             </a:fld>
             <a:endParaRPr lang="ko-KR" altLang="en-US"/>
           </a:p>
@@ -1736,7 +1762,7 @@
           <a:p>
             <a:fld id="{5357D70D-0FC2-4F0F-94F2-74B024D3FA26}" type="datetimeFigureOut">
               <a:rPr lang="ko-KR" altLang="en-US" smtClean="0"/>
-              <a:t>2016-09-19</a:t>
+              <a:t>2016-10-13</a:t>
             </a:fld>
             <a:endParaRPr lang="ko-KR" altLang="en-US"/>
           </a:p>
@@ -1831,7 +1857,7 @@
           <a:p>
             <a:fld id="{5357D70D-0FC2-4F0F-94F2-74B024D3FA26}" type="datetimeFigureOut">
               <a:rPr lang="ko-KR" altLang="en-US" smtClean="0"/>
-              <a:t>2016-09-19</a:t>
+              <a:t>2016-10-13</a:t>
             </a:fld>
             <a:endParaRPr lang="ko-KR" altLang="en-US"/>
           </a:p>
@@ -2108,7 +2134,7 @@
           <a:p>
             <a:fld id="{5357D70D-0FC2-4F0F-94F2-74B024D3FA26}" type="datetimeFigureOut">
               <a:rPr lang="ko-KR" altLang="en-US" smtClean="0"/>
-              <a:t>2016-09-19</a:t>
+              <a:t>2016-10-13</a:t>
             </a:fld>
             <a:endParaRPr lang="ko-KR" altLang="en-US"/>
           </a:p>
@@ -2361,7 +2387,7 @@
           <a:p>
             <a:fld id="{5357D70D-0FC2-4F0F-94F2-74B024D3FA26}" type="datetimeFigureOut">
               <a:rPr lang="ko-KR" altLang="en-US" smtClean="0"/>
-              <a:t>2016-09-19</a:t>
+              <a:t>2016-10-13</a:t>
             </a:fld>
             <a:endParaRPr lang="ko-KR" altLang="en-US"/>
           </a:p>
@@ -2577,7 +2603,7 @@
           <a:p>
             <a:fld id="{5357D70D-0FC2-4F0F-94F2-74B024D3FA26}" type="datetimeFigureOut">
               <a:rPr lang="ko-KR" altLang="en-US" smtClean="0"/>
-              <a:t>2016-09-19</a:t>
+              <a:t>2016-10-13</a:t>
             </a:fld>
             <a:endParaRPr lang="ko-KR" altLang="en-US"/>
           </a:p>

</xml_diff>